<commit_message>
modified presentation to contain link slide
</commit_message>
<xml_diff>
--- a/3sep_lecture/Ecmascript 2015 and Aurelia.pptx
+++ b/3sep_lecture/Ecmascript 2015 and Aurelia.pptx
@@ -24,6 +24,7 @@
     <p:sldId id="275" r:id="rId18"/>
     <p:sldId id="276" r:id="rId19"/>
     <p:sldId id="277" r:id="rId20"/>
+    <p:sldId id="279" r:id="rId21"/>
   </p:sldIdLst>
   <p:sldSz cx="12192000" cy="6858000"/>
   <p:notesSz cx="6858000" cy="9144000"/>
@@ -4647,11 +4648,7 @@
             </a:r>
             <a:r>
               <a:rPr lang="sv-SE" dirty="0" smtClean="0"/>
-              <a:t> to </a:t>
-            </a:r>
-            <a:r>
-              <a:rPr lang="sv-SE" dirty="0" smtClean="0"/>
-              <a:t>{{}}</a:t>
+              <a:t> to {{}}</a:t>
             </a:r>
             <a:endParaRPr lang="sv-SE" dirty="0"/>
           </a:p>
@@ -8853,7 +8850,6 @@
               <a:rPr lang="sv-SE" dirty="0"/>
               <a:t>2</a:t>
             </a:r>
-            <a:endParaRPr lang="sv-SE" dirty="0"/>
           </a:p>
         </p:txBody>
       </p:sp>
@@ -12344,11 +12340,7 @@
             </a:r>
             <a:r>
               <a:rPr lang="sv-SE" i="1" dirty="0" smtClean="0"/>
-              <a:t> </a:t>
-            </a:r>
-            <a:r>
-              <a:rPr lang="sv-SE" i="1" dirty="0" smtClean="0"/>
-              <a:t>a </a:t>
+              <a:t> a </a:t>
             </a:r>
             <a:r>
               <a:rPr lang="sv-SE" i="1" dirty="0" err="1"/>
@@ -19853,11 +19845,7 @@
             </a:r>
             <a:r>
               <a:rPr lang="sv-SE" i="1" dirty="0" smtClean="0"/>
-              <a:t> </a:t>
-            </a:r>
-            <a:r>
-              <a:rPr lang="sv-SE" i="1" dirty="0" smtClean="0"/>
-              <a:t>route in app.js </a:t>
+              <a:t> route in app.js </a:t>
             </a:r>
             <a:endParaRPr lang="sv-SE" i="1" dirty="0"/>
           </a:p>
@@ -20087,7 +20075,6 @@
               <a:rPr lang="sv-SE" dirty="0"/>
               <a:t>2</a:t>
             </a:r>
-            <a:endParaRPr lang="sv-SE" dirty="0"/>
           </a:p>
         </p:txBody>
       </p:sp>
@@ -20131,7 +20118,6 @@
               <a:rPr lang="sv-SE" dirty="0"/>
               <a:t>3</a:t>
             </a:r>
-            <a:endParaRPr lang="sv-SE" dirty="0"/>
           </a:p>
         </p:txBody>
       </p:sp>
@@ -22673,7 +22659,6 @@
               <a:rPr lang="sv-SE" dirty="0"/>
               <a:t>2</a:t>
             </a:r>
-            <a:endParaRPr lang="sv-SE" dirty="0"/>
           </a:p>
         </p:txBody>
       </p:sp>
@@ -23883,6 +23868,195 @@
 </p:sld>
 </file>
 
+<file path=ppt/slides/slide20.xml><?xml version="1.0" encoding="utf-8"?>
+<p:sld xmlns:a="http://schemas.openxmlformats.org/drawingml/2006/main" xmlns:r="http://schemas.openxmlformats.org/officeDocument/2006/relationships" xmlns:p="http://schemas.openxmlformats.org/presentationml/2006/main">
+  <p:cSld>
+    <p:spTree>
+      <p:nvGrpSpPr>
+        <p:cNvPr id="1" name=""/>
+        <p:cNvGrpSpPr/>
+        <p:nvPr/>
+      </p:nvGrpSpPr>
+      <p:grpSpPr>
+        <a:xfrm>
+          <a:off x="0" y="0"/>
+          <a:ext cx="0" cy="0"/>
+          <a:chOff x="0" y="0"/>
+          <a:chExt cx="0" cy="0"/>
+        </a:xfrm>
+      </p:grpSpPr>
+      <p:sp>
+        <p:nvSpPr>
+          <p:cNvPr id="2" name="Title 1"/>
+          <p:cNvSpPr>
+            <a:spLocks noGrp="1"/>
+          </p:cNvSpPr>
+          <p:nvPr>
+            <p:ph type="title"/>
+          </p:nvPr>
+        </p:nvSpPr>
+        <p:spPr/>
+        <p:txBody>
+          <a:bodyPr/>
+          <a:lstStyle/>
+          <a:p>
+            <a:r>
+              <a:rPr lang="sv-SE" dirty="0" err="1" smtClean="0"/>
+              <a:t>Questions</a:t>
+            </a:r>
+            <a:r>
+              <a:rPr lang="sv-SE" dirty="0" smtClean="0"/>
+              <a:t>?</a:t>
+            </a:r>
+            <a:endParaRPr lang="sv-SE" dirty="0"/>
+          </a:p>
+        </p:txBody>
+      </p:sp>
+      <p:sp>
+        <p:nvSpPr>
+          <p:cNvPr id="3" name="Content Placeholder 2"/>
+          <p:cNvSpPr>
+            <a:spLocks noGrp="1"/>
+          </p:cNvSpPr>
+          <p:nvPr>
+            <p:ph idx="1"/>
+          </p:nvPr>
+        </p:nvSpPr>
+        <p:spPr/>
+        <p:txBody>
+          <a:bodyPr/>
+          <a:lstStyle/>
+          <a:p>
+            <a:r>
+              <a:rPr lang="sv-SE" dirty="0">
+                <a:hlinkClick r:id="rId2"/>
+              </a:rPr>
+              <a:t>http://</a:t>
+            </a:r>
+            <a:r>
+              <a:rPr lang="sv-SE" dirty="0" smtClean="0">
+                <a:hlinkClick r:id="rId2"/>
+              </a:rPr>
+              <a:t>aurelia.io/docs.html</a:t>
+            </a:r>
+            <a:endParaRPr lang="sv-SE" dirty="0" smtClean="0"/>
+          </a:p>
+          <a:p>
+            <a:r>
+              <a:rPr lang="sv-SE" dirty="0">
+                <a:hlinkClick r:id="rId3"/>
+              </a:rPr>
+              <a:t>http://</a:t>
+            </a:r>
+            <a:r>
+              <a:rPr lang="sv-SE" dirty="0" smtClean="0">
+                <a:hlinkClick r:id="rId3"/>
+              </a:rPr>
+              <a:t>aurelia.io/get-started.html</a:t>
+            </a:r>
+            <a:endParaRPr lang="sv-SE" dirty="0" smtClean="0"/>
+          </a:p>
+          <a:p>
+            <a:r>
+              <a:rPr lang="sv-SE" dirty="0">
+                <a:hlinkClick r:id="rId4"/>
+              </a:rPr>
+              <a:t>https://</a:t>
+            </a:r>
+            <a:r>
+              <a:rPr lang="sv-SE" dirty="0" smtClean="0">
+                <a:hlinkClick r:id="rId4"/>
+              </a:rPr>
+              <a:t>github.com/softchris/angular_meetup/tree/master/3sep_lecture</a:t>
+            </a:r>
+            <a:r>
+              <a:rPr lang="sv-SE" dirty="0" smtClean="0"/>
+              <a:t>  </a:t>
+            </a:r>
+            <a:r>
+              <a:rPr lang="sv-SE" dirty="0" err="1" smtClean="0"/>
+              <a:t>slides</a:t>
+            </a:r>
+            <a:r>
+              <a:rPr lang="sv-SE" dirty="0" smtClean="0"/>
+              <a:t> + </a:t>
+            </a:r>
+            <a:r>
+              <a:rPr lang="sv-SE" dirty="0" err="1" smtClean="0"/>
+              <a:t>code</a:t>
+            </a:r>
+            <a:r>
+              <a:rPr lang="sv-SE" dirty="0" smtClean="0"/>
+              <a:t> </a:t>
+            </a:r>
+            <a:r>
+              <a:rPr lang="sv-SE" dirty="0" err="1" smtClean="0"/>
+              <a:t>samples</a:t>
+            </a:r>
+            <a:r>
+              <a:rPr lang="sv-SE" dirty="0" smtClean="0"/>
+              <a:t> from </a:t>
+            </a:r>
+            <a:r>
+              <a:rPr lang="sv-SE" dirty="0" err="1" smtClean="0"/>
+              <a:t>today</a:t>
+            </a:r>
+            <a:r>
+              <a:rPr lang="sv-SE" dirty="0" smtClean="0"/>
+              <a:t>, </a:t>
+            </a:r>
+            <a:r>
+              <a:rPr lang="sv-SE" dirty="0" err="1" smtClean="0"/>
+              <a:t>will</a:t>
+            </a:r>
+            <a:r>
+              <a:rPr lang="sv-SE" dirty="0" smtClean="0"/>
+              <a:t> post in the </a:t>
+            </a:r>
+            <a:r>
+              <a:rPr lang="sv-SE" dirty="0" err="1" smtClean="0"/>
+              <a:t>meetup</a:t>
+            </a:r>
+            <a:r>
+              <a:rPr lang="sv-SE" dirty="0" smtClean="0"/>
+              <a:t> </a:t>
+            </a:r>
+            <a:r>
+              <a:rPr lang="sv-SE" dirty="0" err="1" smtClean="0"/>
+              <a:t>group</a:t>
+            </a:r>
+            <a:r>
+              <a:rPr lang="sv-SE" dirty="0" smtClean="0"/>
+              <a:t> </a:t>
+            </a:r>
+            <a:r>
+              <a:rPr lang="sv-SE" smtClean="0"/>
+              <a:t>too</a:t>
+            </a:r>
+            <a:endParaRPr lang="sv-SE"/>
+          </a:p>
+        </p:txBody>
+      </p:sp>
+    </p:spTree>
+    <p:extLst>
+      <p:ext uri="{BB962C8B-B14F-4D97-AF65-F5344CB8AC3E}">
+        <p14:creationId xmlns:p14="http://schemas.microsoft.com/office/powerpoint/2010/main" val="1881654734"/>
+      </p:ext>
+    </p:extLst>
+  </p:cSld>
+  <p:clrMapOvr>
+    <a:masterClrMapping/>
+  </p:clrMapOvr>
+  <p:timing>
+    <p:tnLst>
+      <p:par>
+        <p:cTn id="1" dur="indefinite" restart="never" nodeType="tmRoot"/>
+      </p:par>
+    </p:tnLst>
+  </p:timing>
+</p:sld>
+</file>
+
 <file path=ppt/slides/slide3.xml><?xml version="1.0" encoding="utf-8"?>
 <p:sld xmlns:a="http://schemas.openxmlformats.org/drawingml/2006/main" xmlns:r="http://schemas.openxmlformats.org/officeDocument/2006/relationships" xmlns:p="http://schemas.openxmlformats.org/presentationml/2006/main">
   <p:cSld>
@@ -24233,7 +24407,6 @@
               <a:rPr lang="sv-SE" dirty="0"/>
               <a:t> calls</a:t>
             </a:r>
-            <a:endParaRPr lang="sv-SE" dirty="0"/>
           </a:p>
         </p:txBody>
       </p:sp>
@@ -27886,13 +28059,8 @@
             </a:r>
             <a:r>
               <a:rPr lang="sv-SE" sz="2800" dirty="0" smtClean="0"/>
-              <a:t> </a:t>
-            </a:r>
-            <a:r>
-              <a:rPr lang="sv-SE" sz="2800" dirty="0" smtClean="0"/>
-              <a:t>by </a:t>
-            </a:r>
-            <a:endParaRPr lang="sv-SE" sz="2800" dirty="0" smtClean="0"/>
+              <a:t> by </a:t>
+            </a:r>
           </a:p>
           <a:p>
             <a:r>
@@ -27934,39 +28102,35 @@
             </a:r>
             <a:r>
               <a:rPr lang="sv-SE" sz="2800" dirty="0" smtClean="0"/>
-              <a:t> </a:t>
-            </a:r>
-            <a:r>
-              <a:rPr lang="sv-SE" sz="2800" dirty="0" smtClean="0"/>
-              <a:t>version </a:t>
+              <a:t> version  </a:t>
+            </a:r>
+          </a:p>
+          <a:p>
+            <a:r>
+              <a:rPr lang="sv-SE" dirty="0" smtClean="0"/>
+              <a:t>Pre beta </a:t>
+            </a:r>
+            <a:r>
+              <a:rPr lang="sv-SE" dirty="0" err="1" smtClean="0"/>
+              <a:t>stage</a:t>
+            </a:r>
+            <a:endParaRPr lang="sv-SE" dirty="0" smtClean="0"/>
+          </a:p>
+          <a:p>
+            <a:endParaRPr lang="sv-SE" sz="2800" dirty="0" smtClean="0"/>
+          </a:p>
+          <a:p>
+            <a:r>
+              <a:rPr lang="sv-SE" sz="2800" dirty="0" err="1" smtClean="0"/>
+              <a:t>Offical</a:t>
             </a:r>
             <a:r>
               <a:rPr lang="sv-SE" sz="2800" dirty="0" smtClean="0"/>
               <a:t> </a:t>
             </a:r>
-          </a:p>
-          <a:p>
-            <a:r>
-              <a:rPr lang="sv-SE" dirty="0" smtClean="0"/>
-              <a:t>Pre </a:t>
-            </a:r>
-            <a:r>
-              <a:rPr lang="sv-SE" dirty="0" smtClean="0"/>
-              <a:t>beta </a:t>
-            </a:r>
-            <a:r>
-              <a:rPr lang="sv-SE" dirty="0" err="1" smtClean="0"/>
-              <a:t>stage</a:t>
-            </a:r>
-            <a:endParaRPr lang="sv-SE" dirty="0" smtClean="0"/>
-          </a:p>
-          <a:p>
-            <a:endParaRPr lang="sv-SE" sz="2800" dirty="0" smtClean="0"/>
-          </a:p>
-          <a:p>
             <a:r>
               <a:rPr lang="sv-SE" sz="2800" dirty="0" err="1" smtClean="0"/>
-              <a:t>Offical</a:t>
+              <a:t>product</a:t>
             </a:r>
             <a:r>
               <a:rPr lang="sv-SE" sz="2800" dirty="0" smtClean="0"/>
@@ -27974,21 +28138,12 @@
             </a:r>
             <a:r>
               <a:rPr lang="sv-SE" sz="2800" dirty="0" err="1" smtClean="0"/>
-              <a:t>product</a:t>
+              <a:t>of</a:t>
             </a:r>
             <a:r>
               <a:rPr lang="sv-SE" sz="2800" dirty="0" smtClean="0"/>
               <a:t> </a:t>
             </a:r>
-            <a:r>
-              <a:rPr lang="sv-SE" sz="2800" dirty="0" err="1" smtClean="0"/>
-              <a:t>of</a:t>
-            </a:r>
-            <a:r>
-              <a:rPr lang="sv-SE" sz="2800" dirty="0" smtClean="0"/>
-              <a:t> </a:t>
-            </a:r>
-            <a:endParaRPr lang="sv-SE" sz="2800" dirty="0" smtClean="0"/>
           </a:p>
           <a:p>
             <a:r>

</xml_diff>

<commit_message>
added demo pages to ppt
</commit_message>
<xml_diff>
--- a/3sep_lecture/Ecmascript 2015 and Aurelia.pptx
+++ b/3sep_lecture/Ecmascript 2015 and Aurelia.pptx
@@ -15,16 +15,21 @@
     <p:sldId id="259" r:id="rId9"/>
     <p:sldId id="269" r:id="rId10"/>
     <p:sldId id="270" r:id="rId11"/>
-    <p:sldId id="267" r:id="rId12"/>
-    <p:sldId id="272" r:id="rId13"/>
-    <p:sldId id="271" r:id="rId14"/>
-    <p:sldId id="273" r:id="rId15"/>
-    <p:sldId id="274" r:id="rId16"/>
-    <p:sldId id="266" r:id="rId17"/>
-    <p:sldId id="275" r:id="rId18"/>
-    <p:sldId id="276" r:id="rId19"/>
-    <p:sldId id="277" r:id="rId20"/>
-    <p:sldId id="279" r:id="rId21"/>
+    <p:sldId id="280" r:id="rId12"/>
+    <p:sldId id="267" r:id="rId13"/>
+    <p:sldId id="281" r:id="rId14"/>
+    <p:sldId id="272" r:id="rId15"/>
+    <p:sldId id="271" r:id="rId16"/>
+    <p:sldId id="282" r:id="rId17"/>
+    <p:sldId id="273" r:id="rId18"/>
+    <p:sldId id="274" r:id="rId19"/>
+    <p:sldId id="266" r:id="rId20"/>
+    <p:sldId id="283" r:id="rId21"/>
+    <p:sldId id="275" r:id="rId22"/>
+    <p:sldId id="276" r:id="rId23"/>
+    <p:sldId id="277" r:id="rId24"/>
+    <p:sldId id="284" r:id="rId25"/>
+    <p:sldId id="279" r:id="rId26"/>
   </p:sldIdLst>
   <p:sldSz cx="12192000" cy="6858000"/>
   <p:notesSz cx="6858000" cy="9144000"/>
@@ -4797,6 +4802,71 @@
             <p:ph type="title"/>
           </p:nvPr>
         </p:nvSpPr>
+        <p:spPr>
+          <a:xfrm>
+            <a:off x="4734791" y="2692688"/>
+            <a:ext cx="10515600" cy="1325563"/>
+          </a:xfrm>
+        </p:spPr>
+        <p:txBody>
+          <a:bodyPr/>
+          <a:lstStyle/>
+          <a:p>
+            <a:r>
+              <a:rPr lang="sv-SE" dirty="0" smtClean="0"/>
+              <a:t>Demo 01</a:t>
+            </a:r>
+            <a:endParaRPr lang="sv-SE" dirty="0"/>
+          </a:p>
+        </p:txBody>
+      </p:sp>
+    </p:spTree>
+    <p:extLst>
+      <p:ext uri="{BB962C8B-B14F-4D97-AF65-F5344CB8AC3E}">
+        <p14:creationId xmlns:p14="http://schemas.microsoft.com/office/powerpoint/2010/main" val="4116266971"/>
+      </p:ext>
+    </p:extLst>
+  </p:cSld>
+  <p:clrMapOvr>
+    <a:masterClrMapping/>
+  </p:clrMapOvr>
+  <p:timing>
+    <p:tnLst>
+      <p:par>
+        <p:cTn id="1" dur="indefinite" restart="never" nodeType="tmRoot"/>
+      </p:par>
+    </p:tnLst>
+  </p:timing>
+</p:sld>
+</file>
+
+<file path=ppt/slides/slide12.xml><?xml version="1.0" encoding="utf-8"?>
+<p:sld xmlns:a="http://schemas.openxmlformats.org/drawingml/2006/main" xmlns:r="http://schemas.openxmlformats.org/officeDocument/2006/relationships" xmlns:p="http://schemas.openxmlformats.org/presentationml/2006/main">
+  <p:cSld>
+    <p:spTree>
+      <p:nvGrpSpPr>
+        <p:cNvPr id="1" name=""/>
+        <p:cNvGrpSpPr/>
+        <p:nvPr/>
+      </p:nvGrpSpPr>
+      <p:grpSpPr>
+        <a:xfrm>
+          <a:off x="0" y="0"/>
+          <a:ext cx="0" cy="0"/>
+          <a:chOff x="0" y="0"/>
+          <a:chExt cx="0" cy="0"/>
+        </a:xfrm>
+      </p:grpSpPr>
+      <p:sp>
+        <p:nvSpPr>
+          <p:cNvPr id="2" name="Title 1"/>
+          <p:cNvSpPr>
+            <a:spLocks noGrp="1"/>
+          </p:cNvSpPr>
+          <p:nvPr>
+            <p:ph type="title"/>
+          </p:nvPr>
+        </p:nvSpPr>
         <p:spPr/>
         <p:txBody>
           <a:bodyPr/>
@@ -7555,7 +7625,77 @@
 </p:sld>
 </file>
 
-<file path=ppt/slides/slide12.xml><?xml version="1.0" encoding="utf-8"?>
+<file path=ppt/slides/slide13.xml><?xml version="1.0" encoding="utf-8"?>
+<p:sld xmlns:a="http://schemas.openxmlformats.org/drawingml/2006/main" xmlns:r="http://schemas.openxmlformats.org/officeDocument/2006/relationships" xmlns:p="http://schemas.openxmlformats.org/presentationml/2006/main">
+  <p:cSld>
+    <p:spTree>
+      <p:nvGrpSpPr>
+        <p:cNvPr id="1" name=""/>
+        <p:cNvGrpSpPr/>
+        <p:nvPr/>
+      </p:nvGrpSpPr>
+      <p:grpSpPr>
+        <a:xfrm>
+          <a:off x="0" y="0"/>
+          <a:ext cx="0" cy="0"/>
+          <a:chOff x="0" y="0"/>
+          <a:chExt cx="0" cy="0"/>
+        </a:xfrm>
+      </p:grpSpPr>
+      <p:sp>
+        <p:nvSpPr>
+          <p:cNvPr id="4" name="Rectangle 3"/>
+          <p:cNvSpPr/>
+          <p:nvPr/>
+        </p:nvSpPr>
+        <p:spPr>
+          <a:xfrm>
+            <a:off x="4965005" y="2714397"/>
+            <a:ext cx="4016805" cy="769441"/>
+          </a:xfrm>
+          <a:prstGeom prst="rect">
+            <a:avLst/>
+          </a:prstGeom>
+        </p:spPr>
+        <p:txBody>
+          <a:bodyPr wrap="none">
+            <a:spAutoFit/>
+          </a:bodyPr>
+          <a:lstStyle/>
+          <a:p>
+            <a:r>
+              <a:rPr lang="sv-SE" sz="4400" dirty="0"/>
+              <a:t>Demo </a:t>
+            </a:r>
+            <a:r>
+              <a:rPr lang="sv-SE" sz="4400" dirty="0" smtClean="0"/>
+              <a:t>02 - forms</a:t>
+            </a:r>
+            <a:endParaRPr lang="sv-SE" sz="4400" dirty="0"/>
+          </a:p>
+        </p:txBody>
+      </p:sp>
+    </p:spTree>
+    <p:extLst>
+      <p:ext uri="{BB962C8B-B14F-4D97-AF65-F5344CB8AC3E}">
+        <p14:creationId xmlns:p14="http://schemas.microsoft.com/office/powerpoint/2010/main" val="1053327826"/>
+      </p:ext>
+    </p:extLst>
+  </p:cSld>
+  <p:clrMapOvr>
+    <a:masterClrMapping/>
+  </p:clrMapOvr>
+  <p:timing>
+    <p:tnLst>
+      <p:par>
+        <p:cTn id="1" dur="indefinite" restart="never" nodeType="tmRoot"/>
+      </p:par>
+    </p:tnLst>
+  </p:timing>
+</p:sld>
+</file>
+
+<file path=ppt/slides/slide14.xml><?xml version="1.0" encoding="utf-8"?>
 <p:sld xmlns:a="http://schemas.openxmlformats.org/drawingml/2006/main" xmlns:r="http://schemas.openxmlformats.org/officeDocument/2006/relationships" xmlns:p="http://schemas.openxmlformats.org/presentationml/2006/main">
   <p:cSld>
     <p:spTree>
@@ -8873,7 +9013,7 @@
 </p:sld>
 </file>
 
-<file path=ppt/slides/slide13.xml><?xml version="1.0" encoding="utf-8"?>
+<file path=ppt/slides/slide15.xml><?xml version="1.0" encoding="utf-8"?>
 <p:sld xmlns:a="http://schemas.openxmlformats.org/drawingml/2006/main" xmlns:r="http://schemas.openxmlformats.org/officeDocument/2006/relationships" xmlns:p="http://schemas.openxmlformats.org/presentationml/2006/main">
   <p:cSld>
     <p:spTree>
@@ -11598,7 +11738,77 @@
 </p:sld>
 </file>
 
-<file path=ppt/slides/slide14.xml><?xml version="1.0" encoding="utf-8"?>
+<file path=ppt/slides/slide16.xml><?xml version="1.0" encoding="utf-8"?>
+<p:sld xmlns:a="http://schemas.openxmlformats.org/drawingml/2006/main" xmlns:r="http://schemas.openxmlformats.org/officeDocument/2006/relationships" xmlns:p="http://schemas.openxmlformats.org/presentationml/2006/main">
+  <p:cSld>
+    <p:spTree>
+      <p:nvGrpSpPr>
+        <p:cNvPr id="1" name=""/>
+        <p:cNvGrpSpPr/>
+        <p:nvPr/>
+      </p:nvGrpSpPr>
+      <p:grpSpPr>
+        <a:xfrm>
+          <a:off x="0" y="0"/>
+          <a:ext cx="0" cy="0"/>
+          <a:chOff x="0" y="0"/>
+          <a:chExt cx="0" cy="0"/>
+        </a:xfrm>
+      </p:grpSpPr>
+      <p:sp>
+        <p:nvSpPr>
+          <p:cNvPr id="4" name="Rectangle 3"/>
+          <p:cNvSpPr/>
+          <p:nvPr/>
+        </p:nvSpPr>
+        <p:spPr>
+          <a:xfrm>
+            <a:off x="4185687" y="2797525"/>
+            <a:ext cx="4016805" cy="769441"/>
+          </a:xfrm>
+          <a:prstGeom prst="rect">
+            <a:avLst/>
+          </a:prstGeom>
+        </p:spPr>
+        <p:txBody>
+          <a:bodyPr wrap="none">
+            <a:spAutoFit/>
+          </a:bodyPr>
+          <a:lstStyle/>
+          <a:p>
+            <a:r>
+              <a:rPr lang="sv-SE" sz="4400" dirty="0"/>
+              <a:t>Demo </a:t>
+            </a:r>
+            <a:r>
+              <a:rPr lang="sv-SE" sz="4400" dirty="0" smtClean="0"/>
+              <a:t>03 - forms</a:t>
+            </a:r>
+            <a:endParaRPr lang="sv-SE" sz="4400" dirty="0"/>
+          </a:p>
+        </p:txBody>
+      </p:sp>
+    </p:spTree>
+    <p:extLst>
+      <p:ext uri="{BB962C8B-B14F-4D97-AF65-F5344CB8AC3E}">
+        <p14:creationId xmlns:p14="http://schemas.microsoft.com/office/powerpoint/2010/main" val="509364073"/>
+      </p:ext>
+    </p:extLst>
+  </p:cSld>
+  <p:clrMapOvr>
+    <a:masterClrMapping/>
+  </p:clrMapOvr>
+  <p:timing>
+    <p:tnLst>
+      <p:par>
+        <p:cTn id="1" dur="indefinite" restart="never" nodeType="tmRoot"/>
+      </p:par>
+    </p:tnLst>
+  </p:timing>
+</p:sld>
+</file>
+
+<file path=ppt/slides/slide17.xml><?xml version="1.0" encoding="utf-8"?>
 <p:sld xmlns:a="http://schemas.openxmlformats.org/drawingml/2006/main" xmlns:r="http://schemas.openxmlformats.org/officeDocument/2006/relationships" xmlns:p="http://schemas.openxmlformats.org/presentationml/2006/main">
   <p:cSld>
     <p:spTree>
@@ -13056,7 +13266,7 @@
 </p:sld>
 </file>
 
-<file path=ppt/slides/slide15.xml><?xml version="1.0" encoding="utf-8"?>
+<file path=ppt/slides/slide18.xml><?xml version="1.0" encoding="utf-8"?>
 <p:sld xmlns:a="http://schemas.openxmlformats.org/drawingml/2006/main" xmlns:r="http://schemas.openxmlformats.org/officeDocument/2006/relationships" xmlns:p="http://schemas.openxmlformats.org/presentationml/2006/main">
   <p:cSld>
     <p:spTree>
@@ -15084,7 +15294,7 @@
 </p:sld>
 </file>
 
-<file path=ppt/slides/slide16.xml><?xml version="1.0" encoding="utf-8"?>
+<file path=ppt/slides/slide19.xml><?xml version="1.0" encoding="utf-8"?>
 <p:sld xmlns:a="http://schemas.openxmlformats.org/drawingml/2006/main" xmlns:r="http://schemas.openxmlformats.org/officeDocument/2006/relationships" xmlns:p="http://schemas.openxmlformats.org/presentationml/2006/main">
   <p:cSld>
     <p:spTree>
@@ -16391,7 +16601,974 @@
 </p:sld>
 </file>
 
-<file path=ppt/slides/slide17.xml><?xml version="1.0" encoding="utf-8"?>
+<file path=ppt/slides/slide2.xml><?xml version="1.0" encoding="utf-8"?>
+<p:sld xmlns:a="http://schemas.openxmlformats.org/drawingml/2006/main" xmlns:r="http://schemas.openxmlformats.org/officeDocument/2006/relationships" xmlns:p="http://schemas.openxmlformats.org/presentationml/2006/main">
+  <p:cSld>
+    <p:spTree>
+      <p:nvGrpSpPr>
+        <p:cNvPr id="1" name=""/>
+        <p:cNvGrpSpPr/>
+        <p:nvPr/>
+      </p:nvGrpSpPr>
+      <p:grpSpPr>
+        <a:xfrm>
+          <a:off x="0" y="0"/>
+          <a:ext cx="0" cy="0"/>
+          <a:chOff x="0" y="0"/>
+          <a:chExt cx="0" cy="0"/>
+        </a:xfrm>
+      </p:grpSpPr>
+      <p:pic>
+        <p:nvPicPr>
+          <p:cNvPr id="28" name="Picture 27"/>
+          <p:cNvPicPr>
+            <a:picLocks noChangeAspect="1"/>
+          </p:cNvPicPr>
+          <p:nvPr/>
+        </p:nvPicPr>
+        <p:blipFill>
+          <a:blip r:embed="rId2">
+            <a:extLst>
+              <a:ext uri="{28A0092B-C50C-407E-A947-70E740481C1C}">
+                <a14:useLocalDpi xmlns:a14="http://schemas.microsoft.com/office/drawing/2010/main" val="0"/>
+              </a:ext>
+            </a:extLst>
+          </a:blip>
+          <a:stretch>
+            <a:fillRect/>
+          </a:stretch>
+        </p:blipFill>
+        <p:spPr>
+          <a:xfrm>
+            <a:off x="10263626" y="5036126"/>
+            <a:ext cx="1311847" cy="1365513"/>
+          </a:xfrm>
+          <a:prstGeom prst="rect">
+            <a:avLst/>
+          </a:prstGeom>
+        </p:spPr>
+      </p:pic>
+      <p:sp>
+        <p:nvSpPr>
+          <p:cNvPr id="2" name="Title 1"/>
+          <p:cNvSpPr>
+            <a:spLocks noGrp="1"/>
+          </p:cNvSpPr>
+          <p:nvPr>
+            <p:ph type="title"/>
+          </p:nvPr>
+        </p:nvSpPr>
+        <p:spPr/>
+        <p:txBody>
+          <a:bodyPr/>
+          <a:lstStyle/>
+          <a:p>
+            <a:r>
+              <a:rPr lang="sv-SE" dirty="0" smtClean="0"/>
+              <a:t>ES6/2015, ES7/2016</a:t>
+            </a:r>
+            <a:endParaRPr lang="sv-SE" dirty="0"/>
+          </a:p>
+        </p:txBody>
+      </p:sp>
+      <p:cxnSp>
+        <p:nvCxnSpPr>
+          <p:cNvPr id="9" name="Straight Connector 8"/>
+          <p:cNvCxnSpPr/>
+          <p:nvPr/>
+        </p:nvCxnSpPr>
+        <p:spPr>
+          <a:xfrm>
+            <a:off x="838200" y="4862945"/>
+            <a:ext cx="9770918" cy="0"/>
+          </a:xfrm>
+          <a:prstGeom prst="line">
+            <a:avLst/>
+          </a:prstGeom>
+          <a:ln w="28575"/>
+        </p:spPr>
+        <p:style>
+          <a:lnRef idx="1">
+            <a:schemeClr val="accent1"/>
+          </a:lnRef>
+          <a:fillRef idx="0">
+            <a:schemeClr val="accent1"/>
+          </a:fillRef>
+          <a:effectRef idx="0">
+            <a:schemeClr val="accent1"/>
+          </a:effectRef>
+          <a:fontRef idx="minor">
+            <a:schemeClr val="tx1"/>
+          </a:fontRef>
+        </p:style>
+      </p:cxnSp>
+      <p:cxnSp>
+        <p:nvCxnSpPr>
+          <p:cNvPr id="11" name="Straight Connector 10"/>
+          <p:cNvCxnSpPr/>
+          <p:nvPr/>
+        </p:nvCxnSpPr>
+        <p:spPr>
+          <a:xfrm>
+            <a:off x="1745673" y="4634346"/>
+            <a:ext cx="0" cy="415636"/>
+          </a:xfrm>
+          <a:prstGeom prst="line">
+            <a:avLst/>
+          </a:prstGeom>
+          <a:ln w="28575"/>
+        </p:spPr>
+        <p:style>
+          <a:lnRef idx="1">
+            <a:schemeClr val="accent1"/>
+          </a:lnRef>
+          <a:fillRef idx="0">
+            <a:schemeClr val="accent1"/>
+          </a:fillRef>
+          <a:effectRef idx="0">
+            <a:schemeClr val="accent1"/>
+          </a:effectRef>
+          <a:fontRef idx="minor">
+            <a:schemeClr val="tx1"/>
+          </a:fontRef>
+        </p:style>
+      </p:cxnSp>
+      <p:sp>
+        <p:nvSpPr>
+          <p:cNvPr id="12" name="Rectangle 11"/>
+          <p:cNvSpPr/>
+          <p:nvPr/>
+        </p:nvSpPr>
+        <p:spPr>
+          <a:xfrm>
+            <a:off x="1053817" y="4150715"/>
+            <a:ext cx="1383712" cy="369332"/>
+          </a:xfrm>
+          <a:prstGeom prst="rect">
+            <a:avLst/>
+          </a:prstGeom>
+        </p:spPr>
+        <p:txBody>
+          <a:bodyPr wrap="none">
+            <a:spAutoFit/>
+          </a:bodyPr>
+          <a:lstStyle/>
+          <a:p>
+            <a:r>
+              <a:rPr lang="sv-SE" dirty="0" err="1"/>
+              <a:t>july</a:t>
+            </a:r>
+            <a:r>
+              <a:rPr lang="sv-SE" dirty="0"/>
+              <a:t> 12, 2011</a:t>
+            </a:r>
+          </a:p>
+        </p:txBody>
+      </p:sp>
+      <p:sp>
+        <p:nvSpPr>
+          <p:cNvPr id="13" name="Rectangle 12"/>
+          <p:cNvSpPr/>
+          <p:nvPr/>
+        </p:nvSpPr>
+        <p:spPr>
+          <a:xfrm>
+            <a:off x="621904" y="5138895"/>
+            <a:ext cx="2247538" cy="523220"/>
+          </a:xfrm>
+          <a:prstGeom prst="rect">
+            <a:avLst/>
+          </a:prstGeom>
+        </p:spPr>
+        <p:txBody>
+          <a:bodyPr wrap="none">
+            <a:spAutoFit/>
+          </a:bodyPr>
+          <a:lstStyle/>
+          <a:p>
+            <a:r>
+              <a:rPr lang="sv-SE" sz="1400" dirty="0" err="1"/>
+              <a:t>Es.next</a:t>
+            </a:r>
+            <a:r>
+              <a:rPr lang="sv-SE" sz="1400" dirty="0"/>
+              <a:t> = &gt; </a:t>
+            </a:r>
+            <a:r>
+              <a:rPr lang="sv-SE" sz="1400" dirty="0" err="1"/>
+              <a:t>Harmony</a:t>
+            </a:r>
+            <a:r>
+              <a:rPr lang="sv-SE" sz="1400" dirty="0"/>
+              <a:t>, </a:t>
+            </a:r>
+            <a:endParaRPr lang="sv-SE" sz="1400" dirty="0" smtClean="0"/>
+          </a:p>
+          <a:p>
+            <a:r>
+              <a:rPr lang="sv-SE" sz="1400" dirty="0" err="1" smtClean="0"/>
+              <a:t>first</a:t>
+            </a:r>
+            <a:r>
+              <a:rPr lang="sv-SE" sz="1400" dirty="0" smtClean="0"/>
+              <a:t> </a:t>
+            </a:r>
+            <a:r>
+              <a:rPr lang="sv-SE" sz="1400" dirty="0" err="1"/>
+              <a:t>working</a:t>
+            </a:r>
+            <a:r>
+              <a:rPr lang="sv-SE" sz="1400" dirty="0"/>
+              <a:t> draft </a:t>
+            </a:r>
+            <a:r>
+              <a:rPr lang="sv-SE" sz="1400" dirty="0" err="1"/>
+              <a:t>published</a:t>
+            </a:r>
+            <a:endParaRPr lang="sv-SE" sz="1400" dirty="0"/>
+          </a:p>
+        </p:txBody>
+      </p:sp>
+      <p:cxnSp>
+        <p:nvCxnSpPr>
+          <p:cNvPr id="14" name="Straight Connector 13"/>
+          <p:cNvCxnSpPr/>
+          <p:nvPr/>
+        </p:nvCxnSpPr>
+        <p:spPr>
+          <a:xfrm>
+            <a:off x="6137568" y="4634346"/>
+            <a:ext cx="0" cy="415636"/>
+          </a:xfrm>
+          <a:prstGeom prst="line">
+            <a:avLst/>
+          </a:prstGeom>
+          <a:ln w="28575"/>
+        </p:spPr>
+        <p:style>
+          <a:lnRef idx="1">
+            <a:schemeClr val="accent1"/>
+          </a:lnRef>
+          <a:fillRef idx="0">
+            <a:schemeClr val="accent1"/>
+          </a:fillRef>
+          <a:effectRef idx="0">
+            <a:schemeClr val="accent1"/>
+          </a:effectRef>
+          <a:fontRef idx="minor">
+            <a:schemeClr val="tx1"/>
+          </a:fontRef>
+        </p:style>
+      </p:cxnSp>
+      <p:sp>
+        <p:nvSpPr>
+          <p:cNvPr id="15" name="Rectangle 14"/>
+          <p:cNvSpPr/>
+          <p:nvPr/>
+        </p:nvSpPr>
+        <p:spPr>
+          <a:xfrm>
+            <a:off x="5614027" y="4147889"/>
+            <a:ext cx="1047082" cy="369332"/>
+          </a:xfrm>
+          <a:prstGeom prst="rect">
+            <a:avLst/>
+          </a:prstGeom>
+        </p:spPr>
+        <p:txBody>
+          <a:bodyPr wrap="none">
+            <a:spAutoFit/>
+          </a:bodyPr>
+          <a:lstStyle/>
+          <a:p>
+            <a:r>
+              <a:rPr lang="sv-SE" dirty="0"/>
+              <a:t>aug 2014</a:t>
+            </a:r>
+          </a:p>
+        </p:txBody>
+      </p:sp>
+      <p:sp>
+        <p:nvSpPr>
+          <p:cNvPr id="16" name="Rectangle 15"/>
+          <p:cNvSpPr/>
+          <p:nvPr/>
+        </p:nvSpPr>
+        <p:spPr>
+          <a:xfrm>
+            <a:off x="5178441" y="5138895"/>
+            <a:ext cx="1758751" cy="307777"/>
+          </a:xfrm>
+          <a:prstGeom prst="rect">
+            <a:avLst/>
+          </a:prstGeom>
+        </p:spPr>
+        <p:txBody>
+          <a:bodyPr wrap="none">
+            <a:spAutoFit/>
+          </a:bodyPr>
+          <a:lstStyle/>
+          <a:p>
+            <a:r>
+              <a:rPr lang="sv-SE" sz="1400" dirty="0"/>
+              <a:t>draft is feature </a:t>
+            </a:r>
+            <a:r>
+              <a:rPr lang="sv-SE" sz="1400" dirty="0" err="1"/>
+              <a:t>frozen</a:t>
+            </a:r>
+            <a:endParaRPr lang="sv-SE" sz="1400" dirty="0"/>
+          </a:p>
+        </p:txBody>
+      </p:sp>
+      <p:cxnSp>
+        <p:nvCxnSpPr>
+          <p:cNvPr id="17" name="Straight Connector 16"/>
+          <p:cNvCxnSpPr/>
+          <p:nvPr/>
+        </p:nvCxnSpPr>
+        <p:spPr>
+          <a:xfrm>
+            <a:off x="8586359" y="4634346"/>
+            <a:ext cx="0" cy="415636"/>
+          </a:xfrm>
+          <a:prstGeom prst="line">
+            <a:avLst/>
+          </a:prstGeom>
+          <a:ln w="28575"/>
+        </p:spPr>
+        <p:style>
+          <a:lnRef idx="1">
+            <a:schemeClr val="accent1"/>
+          </a:lnRef>
+          <a:fillRef idx="0">
+            <a:schemeClr val="accent1"/>
+          </a:fillRef>
+          <a:effectRef idx="0">
+            <a:schemeClr val="accent1"/>
+          </a:effectRef>
+          <a:fontRef idx="minor">
+            <a:schemeClr val="tx1"/>
+          </a:fontRef>
+        </p:style>
+      </p:cxnSp>
+      <p:sp>
+        <p:nvSpPr>
+          <p:cNvPr id="18" name="Rectangle 17"/>
+          <p:cNvSpPr/>
+          <p:nvPr/>
+        </p:nvSpPr>
+        <p:spPr>
+          <a:xfrm>
+            <a:off x="8026750" y="4147889"/>
+            <a:ext cx="1119217" cy="369332"/>
+          </a:xfrm>
+          <a:prstGeom prst="rect">
+            <a:avLst/>
+          </a:prstGeom>
+        </p:spPr>
+        <p:txBody>
+          <a:bodyPr wrap="none">
+            <a:spAutoFit/>
+          </a:bodyPr>
+          <a:lstStyle/>
+          <a:p>
+            <a:r>
+              <a:rPr lang="sv-SE" dirty="0" err="1"/>
+              <a:t>june</a:t>
+            </a:r>
+            <a:r>
+              <a:rPr lang="sv-SE" dirty="0"/>
+              <a:t> 2015</a:t>
+            </a:r>
+          </a:p>
+        </p:txBody>
+      </p:sp>
+      <p:sp>
+        <p:nvSpPr>
+          <p:cNvPr id="19" name="Rectangle 18"/>
+          <p:cNvSpPr/>
+          <p:nvPr/>
+        </p:nvSpPr>
+        <p:spPr>
+          <a:xfrm>
+            <a:off x="7493976" y="5138895"/>
+            <a:ext cx="1909305" cy="307777"/>
+          </a:xfrm>
+          <a:prstGeom prst="rect">
+            <a:avLst/>
+          </a:prstGeom>
+        </p:spPr>
+        <p:txBody>
+          <a:bodyPr wrap="none">
+            <a:spAutoFit/>
+          </a:bodyPr>
+          <a:lstStyle/>
+          <a:p>
+            <a:r>
+              <a:rPr lang="sv-SE" sz="1400" dirty="0" err="1"/>
+              <a:t>published</a:t>
+            </a:r>
+            <a:r>
+              <a:rPr lang="sv-SE" sz="1400" dirty="0"/>
+              <a:t> as a standard</a:t>
+            </a:r>
+          </a:p>
+        </p:txBody>
+      </p:sp>
+      <p:sp>
+        <p:nvSpPr>
+          <p:cNvPr id="20" name="TextBox 19"/>
+          <p:cNvSpPr txBox="1"/>
+          <p:nvPr/>
+        </p:nvSpPr>
+        <p:spPr>
+          <a:xfrm>
+            <a:off x="1053817" y="1610591"/>
+            <a:ext cx="7570278" cy="1477328"/>
+          </a:xfrm>
+          <a:prstGeom prst="rect">
+            <a:avLst/>
+          </a:prstGeom>
+          <a:noFill/>
+        </p:spPr>
+        <p:txBody>
+          <a:bodyPr wrap="none" rtlCol="0">
+            <a:spAutoFit/>
+          </a:bodyPr>
+          <a:lstStyle/>
+          <a:p>
+            <a:r>
+              <a:rPr lang="sv-SE" dirty="0" err="1" smtClean="0"/>
+              <a:t>Where</a:t>
+            </a:r>
+            <a:r>
+              <a:rPr lang="sv-SE" dirty="0" smtClean="0"/>
+              <a:t> </a:t>
+            </a:r>
+            <a:r>
+              <a:rPr lang="sv-SE" dirty="0" err="1" smtClean="0"/>
+              <a:t>are</a:t>
+            </a:r>
+            <a:r>
+              <a:rPr lang="sv-SE" dirty="0" smtClean="0"/>
+              <a:t> </a:t>
+            </a:r>
+            <a:r>
+              <a:rPr lang="sv-SE" dirty="0" err="1" smtClean="0"/>
+              <a:t>we</a:t>
+            </a:r>
+            <a:r>
+              <a:rPr lang="sv-SE" dirty="0" smtClean="0"/>
+              <a:t> </a:t>
+            </a:r>
+            <a:r>
+              <a:rPr lang="sv-SE" dirty="0" err="1" smtClean="0"/>
+              <a:t>now</a:t>
+            </a:r>
+            <a:r>
+              <a:rPr lang="sv-SE" dirty="0" smtClean="0"/>
+              <a:t>?</a:t>
+            </a:r>
+          </a:p>
+          <a:p>
+            <a:r>
+              <a:rPr lang="en-US" dirty="0" smtClean="0"/>
+              <a:t>- some </a:t>
+            </a:r>
+            <a:r>
+              <a:rPr lang="en-US" dirty="0"/>
+              <a:t>features are partially </a:t>
+            </a:r>
+            <a:r>
+              <a:rPr lang="en-US" dirty="0" smtClean="0"/>
+              <a:t>supported</a:t>
+            </a:r>
+            <a:endParaRPr lang="en-US" dirty="0"/>
+          </a:p>
+          <a:p>
+            <a:r>
+              <a:rPr lang="en-US" dirty="0" smtClean="0"/>
+              <a:t>- some </a:t>
+            </a:r>
+            <a:r>
+              <a:rPr lang="en-US" dirty="0"/>
+              <a:t>are not compliant with spec due to implementing an older specification</a:t>
+            </a:r>
+          </a:p>
+          <a:p>
+            <a:r>
+              <a:rPr lang="en-US" dirty="0" smtClean="0"/>
+              <a:t>- some </a:t>
+            </a:r>
+            <a:r>
+              <a:rPr lang="en-US" dirty="0"/>
+              <a:t>are only available in </a:t>
+            </a:r>
+            <a:r>
+              <a:rPr lang="en-US" dirty="0" smtClean="0"/>
+              <a:t>nightly </a:t>
+            </a:r>
+            <a:r>
+              <a:rPr lang="en-US" dirty="0"/>
+              <a:t>builds</a:t>
+            </a:r>
+          </a:p>
+          <a:p>
+            <a:endParaRPr lang="sv-SE" dirty="0"/>
+          </a:p>
+        </p:txBody>
+      </p:sp>
+      <p:sp>
+        <p:nvSpPr>
+          <p:cNvPr id="21" name="Rectangle 20"/>
+          <p:cNvSpPr/>
+          <p:nvPr/>
+        </p:nvSpPr>
+        <p:spPr>
+          <a:xfrm>
+            <a:off x="2743712" y="2878835"/>
+            <a:ext cx="6096000" cy="923330"/>
+          </a:xfrm>
+          <a:prstGeom prst="rect">
+            <a:avLst/>
+          </a:prstGeom>
+        </p:spPr>
+        <p:txBody>
+          <a:bodyPr>
+            <a:spAutoFit/>
+          </a:bodyPr>
+          <a:lstStyle/>
+          <a:p>
+            <a:r>
+              <a:rPr lang="sv-SE" i="1" dirty="0" err="1"/>
+              <a:t>ECMAScript</a:t>
+            </a:r>
+            <a:r>
+              <a:rPr lang="sv-SE" i="1" dirty="0"/>
+              <a:t> 6 is </a:t>
+            </a:r>
+            <a:r>
+              <a:rPr lang="sv-SE" i="1" dirty="0" err="1"/>
+              <a:t>being</a:t>
+            </a:r>
+            <a:r>
+              <a:rPr lang="sv-SE" i="1" dirty="0"/>
+              <a:t> </a:t>
+            </a:r>
+            <a:r>
+              <a:rPr lang="sv-SE" i="1" dirty="0" err="1"/>
+              <a:t>progressively</a:t>
+            </a:r>
+            <a:r>
+              <a:rPr lang="sv-SE" i="1" dirty="0"/>
+              <a:t> </a:t>
+            </a:r>
+            <a:r>
+              <a:rPr lang="sv-SE" i="1" dirty="0" err="1"/>
+              <a:t>implemented</a:t>
+            </a:r>
+            <a:r>
+              <a:rPr lang="sv-SE" i="1" dirty="0"/>
+              <a:t> by browser </a:t>
+            </a:r>
+            <a:r>
+              <a:rPr lang="sv-SE" i="1" dirty="0" err="1"/>
+              <a:t>vendors</a:t>
+            </a:r>
+            <a:r>
+              <a:rPr lang="sv-SE" i="1" dirty="0"/>
+              <a:t> over </a:t>
+            </a:r>
+            <a:r>
+              <a:rPr lang="sv-SE" i="1" dirty="0" err="1"/>
+              <a:t>time</a:t>
+            </a:r>
+            <a:r>
+              <a:rPr lang="sv-SE" i="1" dirty="0"/>
+              <a:t> and as </a:t>
+            </a:r>
+            <a:r>
+              <a:rPr lang="sv-SE" i="1" dirty="0" err="1"/>
+              <a:t>such</a:t>
+            </a:r>
+            <a:r>
+              <a:rPr lang="sv-SE" i="1" dirty="0"/>
+              <a:t> </a:t>
+            </a:r>
+            <a:r>
+              <a:rPr lang="sv-SE" i="1" dirty="0" err="1"/>
+              <a:t>there</a:t>
+            </a:r>
+            <a:r>
+              <a:rPr lang="sv-SE" i="1" dirty="0"/>
+              <a:t> is no ETA on it </a:t>
+            </a:r>
+            <a:r>
+              <a:rPr lang="sv-SE" i="1" dirty="0" err="1"/>
+              <a:t>being</a:t>
+            </a:r>
+            <a:r>
+              <a:rPr lang="sv-SE" i="1" dirty="0"/>
+              <a:t> </a:t>
+            </a:r>
+            <a:r>
+              <a:rPr lang="sv-SE" i="1" dirty="0" err="1"/>
+              <a:t>available</a:t>
+            </a:r>
+            <a:r>
+              <a:rPr lang="sv-SE" i="1" dirty="0"/>
+              <a:t> in all </a:t>
+            </a:r>
+            <a:r>
+              <a:rPr lang="sv-SE" i="1" dirty="0" err="1"/>
+              <a:t>environments</a:t>
+            </a:r>
+            <a:endParaRPr lang="sv-SE" i="1" dirty="0"/>
+          </a:p>
+        </p:txBody>
+      </p:sp>
+      <p:sp>
+        <p:nvSpPr>
+          <p:cNvPr id="22" name="Cloud 21"/>
+          <p:cNvSpPr/>
+          <p:nvPr/>
+        </p:nvSpPr>
+        <p:spPr>
+          <a:xfrm>
+            <a:off x="8943191" y="2324671"/>
+            <a:ext cx="1946052" cy="1600200"/>
+          </a:xfrm>
+          <a:prstGeom prst="cloud">
+            <a:avLst/>
+          </a:prstGeom>
+        </p:spPr>
+        <p:style>
+          <a:lnRef idx="2">
+            <a:schemeClr val="accent1">
+              <a:shade val="50000"/>
+            </a:schemeClr>
+          </a:lnRef>
+          <a:fillRef idx="1">
+            <a:schemeClr val="accent1"/>
+          </a:fillRef>
+          <a:effectRef idx="0">
+            <a:schemeClr val="accent1"/>
+          </a:effectRef>
+          <a:fontRef idx="minor">
+            <a:schemeClr val="lt1"/>
+          </a:fontRef>
+        </p:style>
+        <p:txBody>
+          <a:bodyPr rtlCol="0" anchor="ctr"/>
+          <a:lstStyle/>
+          <a:p>
+            <a:pPr algn="ctr"/>
+            <a:r>
+              <a:rPr lang="sv-SE" dirty="0" err="1" smtClean="0"/>
+              <a:t>It’s</a:t>
+            </a:r>
+            <a:r>
+              <a:rPr lang="sv-SE" dirty="0" smtClean="0"/>
+              <a:t> </a:t>
+            </a:r>
+            <a:r>
+              <a:rPr lang="sv-SE" dirty="0" err="1" smtClean="0"/>
+              <a:t>done</a:t>
+            </a:r>
+            <a:r>
+              <a:rPr lang="sv-SE" dirty="0" smtClean="0"/>
+              <a:t> </a:t>
+            </a:r>
+            <a:r>
+              <a:rPr lang="sv-SE" dirty="0" err="1" smtClean="0"/>
+              <a:t>when</a:t>
+            </a:r>
+            <a:r>
+              <a:rPr lang="sv-SE" dirty="0" smtClean="0"/>
+              <a:t> </a:t>
+            </a:r>
+            <a:r>
+              <a:rPr lang="sv-SE" dirty="0" err="1" smtClean="0"/>
+              <a:t>its</a:t>
+            </a:r>
+            <a:r>
+              <a:rPr lang="sv-SE" dirty="0" smtClean="0"/>
+              <a:t> </a:t>
+            </a:r>
+            <a:r>
+              <a:rPr lang="sv-SE" dirty="0" err="1" smtClean="0"/>
+              <a:t>done</a:t>
+            </a:r>
+            <a:endParaRPr lang="sv-SE" dirty="0"/>
+          </a:p>
+        </p:txBody>
+      </p:sp>
+      <p:sp>
+        <p:nvSpPr>
+          <p:cNvPr id="23" name="Cloud 22"/>
+          <p:cNvSpPr/>
+          <p:nvPr/>
+        </p:nvSpPr>
+        <p:spPr>
+          <a:xfrm>
+            <a:off x="5791712" y="359544"/>
+            <a:ext cx="1946052" cy="1600200"/>
+          </a:xfrm>
+          <a:prstGeom prst="cloud">
+            <a:avLst/>
+          </a:prstGeom>
+        </p:spPr>
+        <p:style>
+          <a:lnRef idx="2">
+            <a:schemeClr val="accent1">
+              <a:shade val="50000"/>
+            </a:schemeClr>
+          </a:lnRef>
+          <a:fillRef idx="1">
+            <a:schemeClr val="accent1"/>
+          </a:fillRef>
+          <a:effectRef idx="0">
+            <a:schemeClr val="accent1"/>
+          </a:effectRef>
+          <a:fontRef idx="minor">
+            <a:schemeClr val="lt1"/>
+          </a:fontRef>
+        </p:style>
+        <p:txBody>
+          <a:bodyPr rtlCol="0" anchor="ctr"/>
+          <a:lstStyle/>
+          <a:p>
+            <a:pPr algn="ctr"/>
+            <a:r>
+              <a:rPr lang="sv-SE" b="1" dirty="0" err="1" smtClean="0"/>
+              <a:t>Traceur</a:t>
+            </a:r>
+            <a:r>
+              <a:rPr lang="sv-SE" dirty="0" smtClean="0"/>
+              <a:t> and </a:t>
+            </a:r>
+            <a:r>
+              <a:rPr lang="sv-SE" b="1" dirty="0" err="1" smtClean="0"/>
+              <a:t>Bable</a:t>
+            </a:r>
+            <a:r>
+              <a:rPr lang="sv-SE" dirty="0" smtClean="0"/>
+              <a:t> to the </a:t>
+            </a:r>
+            <a:r>
+              <a:rPr lang="sv-SE" dirty="0" err="1" smtClean="0"/>
+              <a:t>rescue</a:t>
+            </a:r>
+            <a:endParaRPr lang="sv-SE" dirty="0"/>
+          </a:p>
+        </p:txBody>
+      </p:sp>
+      <p:sp>
+        <p:nvSpPr>
+          <p:cNvPr id="27" name="AutoShape 4" descr="Bildresultat för michael j fox hoverboard"/>
+          <p:cNvSpPr>
+            <a:spLocks noChangeAspect="1" noChangeArrowheads="1"/>
+          </p:cNvSpPr>
+          <p:nvPr/>
+        </p:nvSpPr>
+        <p:spPr bwMode="auto">
+          <a:xfrm>
+            <a:off x="901417" y="3071840"/>
+            <a:ext cx="304800" cy="304801"/>
+          </a:xfrm>
+          <a:prstGeom prst="rect">
+            <a:avLst/>
+          </a:prstGeom>
+          <a:noFill/>
+          <a:extLst>
+            <a:ext uri="{909E8E84-426E-40DD-AFC4-6F175D3DCCD1}">
+              <a14:hiddenFill xmlns:a14="http://schemas.microsoft.com/office/drawing/2010/main">
+                <a:solidFill>
+                  <a:srgbClr val="FFFFFF"/>
+                </a:solidFill>
+              </a14:hiddenFill>
+            </a:ext>
+          </a:extLst>
+        </p:spPr>
+        <p:txBody>
+          <a:bodyPr vert="horz" wrap="square" lIns="91440" tIns="45720" rIns="91440" bIns="45720" numCol="1" anchor="t" anchorCtr="0" compatLnSpc="1">
+            <a:prstTxWarp prst="textNoShape">
+              <a:avLst/>
+            </a:prstTxWarp>
+          </a:bodyPr>
+          <a:lstStyle/>
+          <a:p>
+            <a:endParaRPr lang="sv-SE"/>
+          </a:p>
+        </p:txBody>
+      </p:sp>
+      <p:cxnSp>
+        <p:nvCxnSpPr>
+          <p:cNvPr id="29" name="Straight Connector 28"/>
+          <p:cNvCxnSpPr/>
+          <p:nvPr/>
+        </p:nvCxnSpPr>
+        <p:spPr>
+          <a:xfrm>
+            <a:off x="9944106" y="4620490"/>
+            <a:ext cx="0" cy="415636"/>
+          </a:xfrm>
+          <a:prstGeom prst="line">
+            <a:avLst/>
+          </a:prstGeom>
+          <a:ln w="28575"/>
+        </p:spPr>
+        <p:style>
+          <a:lnRef idx="1">
+            <a:schemeClr val="accent1"/>
+          </a:lnRef>
+          <a:fillRef idx="0">
+            <a:schemeClr val="accent1"/>
+          </a:fillRef>
+          <a:effectRef idx="0">
+            <a:schemeClr val="accent1"/>
+          </a:effectRef>
+          <a:fontRef idx="minor">
+            <a:schemeClr val="tx1"/>
+          </a:fontRef>
+        </p:style>
+      </p:cxnSp>
+      <p:sp>
+        <p:nvSpPr>
+          <p:cNvPr id="30" name="Rectangle 29"/>
+          <p:cNvSpPr/>
+          <p:nvPr/>
+        </p:nvSpPr>
+        <p:spPr>
+          <a:xfrm>
+            <a:off x="9384497" y="4134033"/>
+            <a:ext cx="1002197" cy="369332"/>
+          </a:xfrm>
+          <a:prstGeom prst="rect">
+            <a:avLst/>
+          </a:prstGeom>
+        </p:spPr>
+        <p:txBody>
+          <a:bodyPr wrap="none">
+            <a:spAutoFit/>
+          </a:bodyPr>
+          <a:lstStyle/>
+          <a:p>
+            <a:r>
+              <a:rPr lang="sv-SE" dirty="0" err="1" smtClean="0"/>
+              <a:t>oct</a:t>
+            </a:r>
+            <a:r>
+              <a:rPr lang="sv-SE" dirty="0" smtClean="0"/>
+              <a:t> </a:t>
+            </a:r>
+            <a:r>
+              <a:rPr lang="sv-SE" dirty="0"/>
+              <a:t>2015</a:t>
+            </a:r>
+          </a:p>
+        </p:txBody>
+      </p:sp>
+    </p:spTree>
+    <p:extLst>
+      <p:ext uri="{BB962C8B-B14F-4D97-AF65-F5344CB8AC3E}">
+        <p14:creationId xmlns:p14="http://schemas.microsoft.com/office/powerpoint/2010/main" val="2611523081"/>
+      </p:ext>
+    </p:extLst>
+  </p:cSld>
+  <p:clrMapOvr>
+    <a:masterClrMapping/>
+  </p:clrMapOvr>
+  <p:timing>
+    <p:tnLst>
+      <p:par>
+        <p:cTn id="1" dur="indefinite" restart="never" nodeType="tmRoot"/>
+      </p:par>
+    </p:tnLst>
+  </p:timing>
+</p:sld>
+</file>
+
+<file path=ppt/slides/slide20.xml><?xml version="1.0" encoding="utf-8"?>
+<p:sld xmlns:a="http://schemas.openxmlformats.org/drawingml/2006/main" xmlns:r="http://schemas.openxmlformats.org/officeDocument/2006/relationships" xmlns:p="http://schemas.openxmlformats.org/presentationml/2006/main">
+  <p:cSld>
+    <p:spTree>
+      <p:nvGrpSpPr>
+        <p:cNvPr id="1" name=""/>
+        <p:cNvGrpSpPr/>
+        <p:nvPr/>
+      </p:nvGrpSpPr>
+      <p:grpSpPr>
+        <a:xfrm>
+          <a:off x="0" y="0"/>
+          <a:ext cx="0" cy="0"/>
+          <a:chOff x="0" y="0"/>
+          <a:chExt cx="0" cy="0"/>
+        </a:xfrm>
+      </p:grpSpPr>
+      <p:sp>
+        <p:nvSpPr>
+          <p:cNvPr id="4" name="Rectangle 3"/>
+          <p:cNvSpPr/>
+          <p:nvPr/>
+        </p:nvSpPr>
+        <p:spPr>
+          <a:xfrm>
+            <a:off x="2595878" y="2839089"/>
+            <a:ext cx="6731843" cy="769441"/>
+          </a:xfrm>
+          <a:prstGeom prst="rect">
+            <a:avLst/>
+          </a:prstGeom>
+        </p:spPr>
+        <p:txBody>
+          <a:bodyPr wrap="none">
+            <a:spAutoFit/>
+          </a:bodyPr>
+          <a:lstStyle/>
+          <a:p>
+            <a:r>
+              <a:rPr lang="sv-SE" sz="4400" dirty="0"/>
+              <a:t>Demo </a:t>
+            </a:r>
+            <a:r>
+              <a:rPr lang="sv-SE" sz="4400" dirty="0" smtClean="0"/>
+              <a:t>05 – </a:t>
+            </a:r>
+            <a:r>
+              <a:rPr lang="sv-SE" sz="4400" dirty="0" err="1" smtClean="0"/>
+              <a:t>custom</a:t>
+            </a:r>
+            <a:r>
+              <a:rPr lang="sv-SE" sz="4400" dirty="0" smtClean="0"/>
+              <a:t> elements</a:t>
+            </a:r>
+            <a:endParaRPr lang="sv-SE" sz="4400" dirty="0"/>
+          </a:p>
+        </p:txBody>
+      </p:sp>
+    </p:spTree>
+    <p:extLst>
+      <p:ext uri="{BB962C8B-B14F-4D97-AF65-F5344CB8AC3E}">
+        <p14:creationId xmlns:p14="http://schemas.microsoft.com/office/powerpoint/2010/main" val="1954482904"/>
+      </p:ext>
+    </p:extLst>
+  </p:cSld>
+  <p:clrMapOvr>
+    <a:masterClrMapping/>
+  </p:clrMapOvr>
+  <p:timing>
+    <p:tnLst>
+      <p:par>
+        <p:cTn id="1" dur="indefinite" restart="never" nodeType="tmRoot"/>
+      </p:par>
+    </p:tnLst>
+  </p:timing>
+</p:sld>
+</file>
+
+<file path=ppt/slides/slide21.xml><?xml version="1.0" encoding="utf-8"?>
 <p:sld xmlns:a="http://schemas.openxmlformats.org/drawingml/2006/main" xmlns:r="http://schemas.openxmlformats.org/officeDocument/2006/relationships" xmlns:p="http://schemas.openxmlformats.org/presentationml/2006/main">
   <p:cSld>
     <p:spTree>
@@ -18322,7 +19499,7 @@
 </p:sld>
 </file>
 
-<file path=ppt/slides/slide18.xml><?xml version="1.0" encoding="utf-8"?>
+<file path=ppt/slides/slide22.xml><?xml version="1.0" encoding="utf-8"?>
 <p:sld xmlns:a="http://schemas.openxmlformats.org/drawingml/2006/main" xmlns:r="http://schemas.openxmlformats.org/officeDocument/2006/relationships" xmlns:p="http://schemas.openxmlformats.org/presentationml/2006/main">
   <p:cSld>
     <p:spTree>
@@ -20141,7 +21318,7 @@
 </p:sld>
 </file>
 
-<file path=ppt/slides/slide19.xml><?xml version="1.0" encoding="utf-8"?>
+<file path=ppt/slides/slide23.xml><?xml version="1.0" encoding="utf-8"?>
 <p:sld xmlns:a="http://schemas.openxmlformats.org/drawingml/2006/main" xmlns:r="http://schemas.openxmlformats.org/officeDocument/2006/relationships" xmlns:p="http://schemas.openxmlformats.org/presentationml/2006/main">
   <p:cSld>
     <p:spTree>
@@ -22979,7 +24156,7 @@
 </p:sld>
 </file>
 
-<file path=ppt/slides/slide2.xml><?xml version="1.0" encoding="utf-8"?>
+<file path=ppt/slides/slide24.xml><?xml version="1.0" encoding="utf-8"?>
 <p:sld xmlns:a="http://schemas.openxmlformats.org/drawingml/2006/main" xmlns:r="http://schemas.openxmlformats.org/officeDocument/2006/relationships" xmlns:p="http://schemas.openxmlformats.org/presentationml/2006/main">
   <p:cSld>
     <p:spTree>
@@ -22996,131 +24173,16 @@
           <a:chExt cx="0" cy="0"/>
         </a:xfrm>
       </p:grpSpPr>
-      <p:pic>
-        <p:nvPicPr>
-          <p:cNvPr id="28" name="Picture 27"/>
-          <p:cNvPicPr>
-            <a:picLocks noChangeAspect="1"/>
-          </p:cNvPicPr>
-          <p:nvPr/>
-        </p:nvPicPr>
-        <p:blipFill>
-          <a:blip r:embed="rId2">
-            <a:extLst>
-              <a:ext uri="{28A0092B-C50C-407E-A947-70E740481C1C}">
-                <a14:useLocalDpi xmlns:a14="http://schemas.microsoft.com/office/drawing/2010/main" val="0"/>
-              </a:ext>
-            </a:extLst>
-          </a:blip>
-          <a:stretch>
-            <a:fillRect/>
-          </a:stretch>
-        </p:blipFill>
-        <p:spPr>
-          <a:xfrm>
-            <a:off x="10263626" y="5036126"/>
-            <a:ext cx="1311847" cy="1365513"/>
-          </a:xfrm>
-          <a:prstGeom prst="rect">
-            <a:avLst/>
-          </a:prstGeom>
-        </p:spPr>
-      </p:pic>
       <p:sp>
         <p:nvSpPr>
-          <p:cNvPr id="2" name="Title 1"/>
-          <p:cNvSpPr>
-            <a:spLocks noGrp="1"/>
-          </p:cNvSpPr>
-          <p:nvPr>
-            <p:ph type="title"/>
-          </p:nvPr>
-        </p:nvSpPr>
-        <p:spPr/>
-        <p:txBody>
-          <a:bodyPr/>
-          <a:lstStyle/>
-          <a:p>
-            <a:r>
-              <a:rPr lang="sv-SE" dirty="0" smtClean="0"/>
-              <a:t>ES6/2015, ES7/2016</a:t>
-            </a:r>
-            <a:endParaRPr lang="sv-SE" dirty="0"/>
-          </a:p>
-        </p:txBody>
-      </p:sp>
-      <p:cxnSp>
-        <p:nvCxnSpPr>
-          <p:cNvPr id="9" name="Straight Connector 8"/>
-          <p:cNvCxnSpPr/>
-          <p:nvPr/>
-        </p:nvCxnSpPr>
-        <p:spPr>
-          <a:xfrm>
-            <a:off x="838200" y="4862945"/>
-            <a:ext cx="9770918" cy="0"/>
-          </a:xfrm>
-          <a:prstGeom prst="line">
-            <a:avLst/>
-          </a:prstGeom>
-          <a:ln w="28575"/>
-        </p:spPr>
-        <p:style>
-          <a:lnRef idx="1">
-            <a:schemeClr val="accent1"/>
-          </a:lnRef>
-          <a:fillRef idx="0">
-            <a:schemeClr val="accent1"/>
-          </a:fillRef>
-          <a:effectRef idx="0">
-            <a:schemeClr val="accent1"/>
-          </a:effectRef>
-          <a:fontRef idx="minor">
-            <a:schemeClr val="tx1"/>
-          </a:fontRef>
-        </p:style>
-      </p:cxnSp>
-      <p:cxnSp>
-        <p:nvCxnSpPr>
-          <p:cNvPr id="11" name="Straight Connector 10"/>
-          <p:cNvCxnSpPr/>
-          <p:nvPr/>
-        </p:nvCxnSpPr>
-        <p:spPr>
-          <a:xfrm>
-            <a:off x="1745673" y="4634346"/>
-            <a:ext cx="0" cy="415636"/>
-          </a:xfrm>
-          <a:prstGeom prst="line">
-            <a:avLst/>
-          </a:prstGeom>
-          <a:ln w="28575"/>
-        </p:spPr>
-        <p:style>
-          <a:lnRef idx="1">
-            <a:schemeClr val="accent1"/>
-          </a:lnRef>
-          <a:fillRef idx="0">
-            <a:schemeClr val="accent1"/>
-          </a:fillRef>
-          <a:effectRef idx="0">
-            <a:schemeClr val="accent1"/>
-          </a:effectRef>
-          <a:fontRef idx="minor">
-            <a:schemeClr val="tx1"/>
-          </a:fontRef>
-        </p:style>
-      </p:cxnSp>
-      <p:sp>
-        <p:nvSpPr>
-          <p:cNvPr id="12" name="Rectangle 11"/>
+          <p:cNvPr id="4" name="Rectangle 3"/>
           <p:cNvSpPr/>
           <p:nvPr/>
         </p:nvSpPr>
         <p:spPr>
           <a:xfrm>
-            <a:off x="1053817" y="4150715"/>
-            <a:ext cx="1383712" cy="369332"/>
+            <a:off x="3884350" y="2704006"/>
+            <a:ext cx="4354590" cy="769441"/>
           </a:xfrm>
           <a:prstGeom prst="rect">
             <a:avLst/>
@@ -23133,725 +24195,25 @@
           <a:lstStyle/>
           <a:p>
             <a:r>
-              <a:rPr lang="sv-SE" dirty="0" err="1"/>
-              <a:t>july</a:t>
-            </a:r>
-            <a:r>
-              <a:rPr lang="sv-SE" dirty="0"/>
-              <a:t> 12, 2011</a:t>
-            </a:r>
-          </a:p>
-        </p:txBody>
-      </p:sp>
-      <p:sp>
-        <p:nvSpPr>
-          <p:cNvPr id="13" name="Rectangle 12"/>
-          <p:cNvSpPr/>
-          <p:nvPr/>
-        </p:nvSpPr>
-        <p:spPr>
-          <a:xfrm>
-            <a:off x="621904" y="5138895"/>
-            <a:ext cx="2247538" cy="523220"/>
-          </a:xfrm>
-          <a:prstGeom prst="rect">
-            <a:avLst/>
-          </a:prstGeom>
-        </p:spPr>
-        <p:txBody>
-          <a:bodyPr wrap="none">
-            <a:spAutoFit/>
-          </a:bodyPr>
-          <a:lstStyle/>
-          <a:p>
-            <a:r>
-              <a:rPr lang="sv-SE" sz="1400" dirty="0" err="1"/>
-              <a:t>Es.next</a:t>
-            </a:r>
-            <a:r>
-              <a:rPr lang="sv-SE" sz="1400" dirty="0"/>
-              <a:t> = &gt; </a:t>
-            </a:r>
-            <a:r>
-              <a:rPr lang="sv-SE" sz="1400" dirty="0" err="1"/>
-              <a:t>Harmony</a:t>
-            </a:r>
-            <a:r>
-              <a:rPr lang="sv-SE" sz="1400" dirty="0"/>
-              <a:t>, </a:t>
-            </a:r>
-            <a:endParaRPr lang="sv-SE" sz="1400" dirty="0" smtClean="0"/>
-          </a:p>
-          <a:p>
-            <a:r>
-              <a:rPr lang="sv-SE" sz="1400" dirty="0" err="1" smtClean="0"/>
-              <a:t>first</a:t>
-            </a:r>
-            <a:r>
-              <a:rPr lang="sv-SE" sz="1400" dirty="0" smtClean="0"/>
-              <a:t> </a:t>
-            </a:r>
-            <a:r>
-              <a:rPr lang="sv-SE" sz="1400" dirty="0" err="1"/>
-              <a:t>working</a:t>
-            </a:r>
-            <a:r>
-              <a:rPr lang="sv-SE" sz="1400" dirty="0"/>
-              <a:t> draft </a:t>
-            </a:r>
-            <a:r>
-              <a:rPr lang="sv-SE" sz="1400" dirty="0" err="1"/>
-              <a:t>published</a:t>
-            </a:r>
-            <a:endParaRPr lang="sv-SE" sz="1400" dirty="0"/>
-          </a:p>
-        </p:txBody>
-      </p:sp>
-      <p:cxnSp>
-        <p:nvCxnSpPr>
-          <p:cNvPr id="14" name="Straight Connector 13"/>
-          <p:cNvCxnSpPr/>
-          <p:nvPr/>
-        </p:nvCxnSpPr>
-        <p:spPr>
-          <a:xfrm>
-            <a:off x="6137568" y="4634346"/>
-            <a:ext cx="0" cy="415636"/>
-          </a:xfrm>
-          <a:prstGeom prst="line">
-            <a:avLst/>
-          </a:prstGeom>
-          <a:ln w="28575"/>
-        </p:spPr>
-        <p:style>
-          <a:lnRef idx="1">
-            <a:schemeClr val="accent1"/>
-          </a:lnRef>
-          <a:fillRef idx="0">
-            <a:schemeClr val="accent1"/>
-          </a:fillRef>
-          <a:effectRef idx="0">
-            <a:schemeClr val="accent1"/>
-          </a:effectRef>
-          <a:fontRef idx="minor">
-            <a:schemeClr val="tx1"/>
-          </a:fontRef>
-        </p:style>
-      </p:cxnSp>
-      <p:sp>
-        <p:nvSpPr>
-          <p:cNvPr id="15" name="Rectangle 14"/>
-          <p:cNvSpPr/>
-          <p:nvPr/>
-        </p:nvSpPr>
-        <p:spPr>
-          <a:xfrm>
-            <a:off x="5614027" y="4147889"/>
-            <a:ext cx="1047082" cy="369332"/>
-          </a:xfrm>
-          <a:prstGeom prst="rect">
-            <a:avLst/>
-          </a:prstGeom>
-        </p:spPr>
-        <p:txBody>
-          <a:bodyPr wrap="none">
-            <a:spAutoFit/>
-          </a:bodyPr>
-          <a:lstStyle/>
-          <a:p>
-            <a:r>
-              <a:rPr lang="sv-SE" dirty="0"/>
-              <a:t>aug 2014</a:t>
-            </a:r>
-          </a:p>
-        </p:txBody>
-      </p:sp>
-      <p:sp>
-        <p:nvSpPr>
-          <p:cNvPr id="16" name="Rectangle 15"/>
-          <p:cNvSpPr/>
-          <p:nvPr/>
-        </p:nvSpPr>
-        <p:spPr>
-          <a:xfrm>
-            <a:off x="5178441" y="5138895"/>
-            <a:ext cx="1758751" cy="307777"/>
-          </a:xfrm>
-          <a:prstGeom prst="rect">
-            <a:avLst/>
-          </a:prstGeom>
-        </p:spPr>
-        <p:txBody>
-          <a:bodyPr wrap="none">
-            <a:spAutoFit/>
-          </a:bodyPr>
-          <a:lstStyle/>
-          <a:p>
-            <a:r>
-              <a:rPr lang="sv-SE" sz="1400" dirty="0"/>
-              <a:t>draft is feature </a:t>
-            </a:r>
-            <a:r>
-              <a:rPr lang="sv-SE" sz="1400" dirty="0" err="1"/>
-              <a:t>frozen</a:t>
-            </a:r>
-            <a:endParaRPr lang="sv-SE" sz="1400" dirty="0"/>
-          </a:p>
-        </p:txBody>
-      </p:sp>
-      <p:cxnSp>
-        <p:nvCxnSpPr>
-          <p:cNvPr id="17" name="Straight Connector 16"/>
-          <p:cNvCxnSpPr/>
-          <p:nvPr/>
-        </p:nvCxnSpPr>
-        <p:spPr>
-          <a:xfrm>
-            <a:off x="8586359" y="4634346"/>
-            <a:ext cx="0" cy="415636"/>
-          </a:xfrm>
-          <a:prstGeom prst="line">
-            <a:avLst/>
-          </a:prstGeom>
-          <a:ln w="28575"/>
-        </p:spPr>
-        <p:style>
-          <a:lnRef idx="1">
-            <a:schemeClr val="accent1"/>
-          </a:lnRef>
-          <a:fillRef idx="0">
-            <a:schemeClr val="accent1"/>
-          </a:fillRef>
-          <a:effectRef idx="0">
-            <a:schemeClr val="accent1"/>
-          </a:effectRef>
-          <a:fontRef idx="minor">
-            <a:schemeClr val="tx1"/>
-          </a:fontRef>
-        </p:style>
-      </p:cxnSp>
-      <p:sp>
-        <p:nvSpPr>
-          <p:cNvPr id="18" name="Rectangle 17"/>
-          <p:cNvSpPr/>
-          <p:nvPr/>
-        </p:nvSpPr>
-        <p:spPr>
-          <a:xfrm>
-            <a:off x="8026750" y="4147889"/>
-            <a:ext cx="1119217" cy="369332"/>
-          </a:xfrm>
-          <a:prstGeom prst="rect">
-            <a:avLst/>
-          </a:prstGeom>
-        </p:spPr>
-        <p:txBody>
-          <a:bodyPr wrap="none">
-            <a:spAutoFit/>
-          </a:bodyPr>
-          <a:lstStyle/>
-          <a:p>
-            <a:r>
-              <a:rPr lang="sv-SE" dirty="0" err="1"/>
-              <a:t>june</a:t>
-            </a:r>
-            <a:r>
-              <a:rPr lang="sv-SE" dirty="0"/>
-              <a:t> 2015</a:t>
-            </a:r>
-          </a:p>
-        </p:txBody>
-      </p:sp>
-      <p:sp>
-        <p:nvSpPr>
-          <p:cNvPr id="19" name="Rectangle 18"/>
-          <p:cNvSpPr/>
-          <p:nvPr/>
-        </p:nvSpPr>
-        <p:spPr>
-          <a:xfrm>
-            <a:off x="7493976" y="5138895"/>
-            <a:ext cx="1909305" cy="307777"/>
-          </a:xfrm>
-          <a:prstGeom prst="rect">
-            <a:avLst/>
-          </a:prstGeom>
-        </p:spPr>
-        <p:txBody>
-          <a:bodyPr wrap="none">
-            <a:spAutoFit/>
-          </a:bodyPr>
-          <a:lstStyle/>
-          <a:p>
-            <a:r>
-              <a:rPr lang="sv-SE" sz="1400" dirty="0" err="1"/>
-              <a:t>published</a:t>
-            </a:r>
-            <a:r>
-              <a:rPr lang="sv-SE" sz="1400" dirty="0"/>
-              <a:t> as a standard</a:t>
-            </a:r>
-          </a:p>
-        </p:txBody>
-      </p:sp>
-      <p:sp>
-        <p:nvSpPr>
-          <p:cNvPr id="20" name="TextBox 19"/>
-          <p:cNvSpPr txBox="1"/>
-          <p:nvPr/>
-        </p:nvSpPr>
-        <p:spPr>
-          <a:xfrm>
-            <a:off x="1053817" y="1610591"/>
-            <a:ext cx="7570278" cy="1477328"/>
-          </a:xfrm>
-          <a:prstGeom prst="rect">
-            <a:avLst/>
-          </a:prstGeom>
-          <a:noFill/>
-        </p:spPr>
-        <p:txBody>
-          <a:bodyPr wrap="none" rtlCol="0">
-            <a:spAutoFit/>
-          </a:bodyPr>
-          <a:lstStyle/>
-          <a:p>
-            <a:r>
-              <a:rPr lang="sv-SE" dirty="0" err="1" smtClean="0"/>
-              <a:t>Where</a:t>
-            </a:r>
-            <a:r>
-              <a:rPr lang="sv-SE" dirty="0" smtClean="0"/>
-              <a:t> </a:t>
-            </a:r>
-            <a:r>
-              <a:rPr lang="sv-SE" dirty="0" err="1" smtClean="0"/>
-              <a:t>are</a:t>
-            </a:r>
-            <a:r>
-              <a:rPr lang="sv-SE" dirty="0" smtClean="0"/>
-              <a:t> </a:t>
-            </a:r>
-            <a:r>
-              <a:rPr lang="sv-SE" dirty="0" err="1" smtClean="0"/>
-              <a:t>we</a:t>
-            </a:r>
-            <a:r>
-              <a:rPr lang="sv-SE" dirty="0" smtClean="0"/>
-              <a:t> </a:t>
-            </a:r>
-            <a:r>
-              <a:rPr lang="sv-SE" dirty="0" err="1" smtClean="0"/>
-              <a:t>now</a:t>
-            </a:r>
-            <a:r>
-              <a:rPr lang="sv-SE" dirty="0" smtClean="0"/>
-              <a:t>?</a:t>
-            </a:r>
-          </a:p>
-          <a:p>
-            <a:r>
-              <a:rPr lang="en-US" dirty="0" smtClean="0"/>
-              <a:t>- some </a:t>
-            </a:r>
-            <a:r>
-              <a:rPr lang="en-US" dirty="0"/>
-              <a:t>features are partially </a:t>
-            </a:r>
-            <a:r>
-              <a:rPr lang="en-US" dirty="0" smtClean="0"/>
-              <a:t>supported</a:t>
-            </a:r>
-            <a:endParaRPr lang="en-US" dirty="0"/>
-          </a:p>
-          <a:p>
-            <a:r>
-              <a:rPr lang="en-US" dirty="0" smtClean="0"/>
-              <a:t>- some </a:t>
-            </a:r>
-            <a:r>
-              <a:rPr lang="en-US" dirty="0"/>
-              <a:t>are not compliant with spec due to implementing an older specification</a:t>
-            </a:r>
-          </a:p>
-          <a:p>
-            <a:r>
-              <a:rPr lang="en-US" dirty="0" smtClean="0"/>
-              <a:t>- some </a:t>
-            </a:r>
-            <a:r>
-              <a:rPr lang="en-US" dirty="0"/>
-              <a:t>are only available in </a:t>
-            </a:r>
-            <a:r>
-              <a:rPr lang="en-US" dirty="0" smtClean="0"/>
-              <a:t>nightly </a:t>
-            </a:r>
-            <a:r>
-              <a:rPr lang="en-US" dirty="0"/>
-              <a:t>builds</a:t>
-            </a:r>
-          </a:p>
-          <a:p>
-            <a:endParaRPr lang="sv-SE" dirty="0"/>
-          </a:p>
-        </p:txBody>
-      </p:sp>
-      <p:sp>
-        <p:nvSpPr>
-          <p:cNvPr id="21" name="Rectangle 20"/>
-          <p:cNvSpPr/>
-          <p:nvPr/>
-        </p:nvSpPr>
-        <p:spPr>
-          <a:xfrm>
-            <a:off x="2743712" y="2878835"/>
-            <a:ext cx="6096000" cy="923330"/>
-          </a:xfrm>
-          <a:prstGeom prst="rect">
-            <a:avLst/>
-          </a:prstGeom>
-        </p:spPr>
-        <p:txBody>
-          <a:bodyPr>
-            <a:spAutoFit/>
-          </a:bodyPr>
-          <a:lstStyle/>
-          <a:p>
-            <a:r>
-              <a:rPr lang="sv-SE" i="1" dirty="0" err="1"/>
-              <a:t>ECMAScript</a:t>
-            </a:r>
-            <a:r>
-              <a:rPr lang="sv-SE" i="1" dirty="0"/>
-              <a:t> 6 is </a:t>
-            </a:r>
-            <a:r>
-              <a:rPr lang="sv-SE" i="1" dirty="0" err="1"/>
-              <a:t>being</a:t>
-            </a:r>
-            <a:r>
-              <a:rPr lang="sv-SE" i="1" dirty="0"/>
-              <a:t> </a:t>
-            </a:r>
-            <a:r>
-              <a:rPr lang="sv-SE" i="1" dirty="0" err="1"/>
-              <a:t>progressively</a:t>
-            </a:r>
-            <a:r>
-              <a:rPr lang="sv-SE" i="1" dirty="0"/>
-              <a:t> </a:t>
-            </a:r>
-            <a:r>
-              <a:rPr lang="sv-SE" i="1" dirty="0" err="1"/>
-              <a:t>implemented</a:t>
-            </a:r>
-            <a:r>
-              <a:rPr lang="sv-SE" i="1" dirty="0"/>
-              <a:t> by browser </a:t>
-            </a:r>
-            <a:r>
-              <a:rPr lang="sv-SE" i="1" dirty="0" err="1"/>
-              <a:t>vendors</a:t>
-            </a:r>
-            <a:r>
-              <a:rPr lang="sv-SE" i="1" dirty="0"/>
-              <a:t> over </a:t>
-            </a:r>
-            <a:r>
-              <a:rPr lang="sv-SE" i="1" dirty="0" err="1"/>
-              <a:t>time</a:t>
-            </a:r>
-            <a:r>
-              <a:rPr lang="sv-SE" i="1" dirty="0"/>
-              <a:t> and as </a:t>
-            </a:r>
-            <a:r>
-              <a:rPr lang="sv-SE" i="1" dirty="0" err="1"/>
-              <a:t>such</a:t>
-            </a:r>
-            <a:r>
-              <a:rPr lang="sv-SE" i="1" dirty="0"/>
-              <a:t> </a:t>
-            </a:r>
-            <a:r>
-              <a:rPr lang="sv-SE" i="1" dirty="0" err="1"/>
-              <a:t>there</a:t>
-            </a:r>
-            <a:r>
-              <a:rPr lang="sv-SE" i="1" dirty="0"/>
-              <a:t> is no ETA on it </a:t>
-            </a:r>
-            <a:r>
-              <a:rPr lang="sv-SE" i="1" dirty="0" err="1"/>
-              <a:t>being</a:t>
-            </a:r>
-            <a:r>
-              <a:rPr lang="sv-SE" i="1" dirty="0"/>
-              <a:t> </a:t>
-            </a:r>
-            <a:r>
-              <a:rPr lang="sv-SE" i="1" dirty="0" err="1"/>
-              <a:t>available</a:t>
-            </a:r>
-            <a:r>
-              <a:rPr lang="sv-SE" i="1" dirty="0"/>
-              <a:t> in all </a:t>
-            </a:r>
-            <a:r>
-              <a:rPr lang="sv-SE" i="1" dirty="0" err="1"/>
-              <a:t>environments</a:t>
-            </a:r>
-            <a:endParaRPr lang="sv-SE" i="1" dirty="0"/>
-          </a:p>
-        </p:txBody>
-      </p:sp>
-      <p:sp>
-        <p:nvSpPr>
-          <p:cNvPr id="22" name="Cloud 21"/>
-          <p:cNvSpPr/>
-          <p:nvPr/>
-        </p:nvSpPr>
-        <p:spPr>
-          <a:xfrm>
-            <a:off x="8943191" y="2324671"/>
-            <a:ext cx="1946052" cy="1600200"/>
-          </a:xfrm>
-          <a:prstGeom prst="cloud">
-            <a:avLst/>
-          </a:prstGeom>
-        </p:spPr>
-        <p:style>
-          <a:lnRef idx="2">
-            <a:schemeClr val="accent1">
-              <a:shade val="50000"/>
-            </a:schemeClr>
-          </a:lnRef>
-          <a:fillRef idx="1">
-            <a:schemeClr val="accent1"/>
-          </a:fillRef>
-          <a:effectRef idx="0">
-            <a:schemeClr val="accent1"/>
-          </a:effectRef>
-          <a:fontRef idx="minor">
-            <a:schemeClr val="lt1"/>
-          </a:fontRef>
-        </p:style>
-        <p:txBody>
-          <a:bodyPr rtlCol="0" anchor="ctr"/>
-          <a:lstStyle/>
-          <a:p>
-            <a:pPr algn="ctr"/>
-            <a:r>
-              <a:rPr lang="sv-SE" dirty="0" err="1" smtClean="0"/>
-              <a:t>It’s</a:t>
-            </a:r>
-            <a:r>
-              <a:rPr lang="sv-SE" dirty="0" smtClean="0"/>
-              <a:t> </a:t>
-            </a:r>
-            <a:r>
-              <a:rPr lang="sv-SE" dirty="0" err="1" smtClean="0"/>
-              <a:t>done</a:t>
-            </a:r>
-            <a:r>
-              <a:rPr lang="sv-SE" dirty="0" smtClean="0"/>
-              <a:t> </a:t>
-            </a:r>
-            <a:r>
-              <a:rPr lang="sv-SE" dirty="0" err="1" smtClean="0"/>
-              <a:t>when</a:t>
-            </a:r>
-            <a:r>
-              <a:rPr lang="sv-SE" dirty="0" smtClean="0"/>
-              <a:t> </a:t>
-            </a:r>
-            <a:r>
-              <a:rPr lang="sv-SE" dirty="0" err="1" smtClean="0"/>
-              <a:t>its</a:t>
-            </a:r>
-            <a:r>
-              <a:rPr lang="sv-SE" dirty="0" smtClean="0"/>
-              <a:t> </a:t>
-            </a:r>
-            <a:r>
-              <a:rPr lang="sv-SE" dirty="0" err="1" smtClean="0"/>
-              <a:t>done</a:t>
-            </a:r>
-            <a:endParaRPr lang="sv-SE" dirty="0"/>
-          </a:p>
-        </p:txBody>
-      </p:sp>
-      <p:sp>
-        <p:nvSpPr>
-          <p:cNvPr id="23" name="Cloud 22"/>
-          <p:cNvSpPr/>
-          <p:nvPr/>
-        </p:nvSpPr>
-        <p:spPr>
-          <a:xfrm>
-            <a:off x="5791712" y="359544"/>
-            <a:ext cx="1946052" cy="1600200"/>
-          </a:xfrm>
-          <a:prstGeom prst="cloud">
-            <a:avLst/>
-          </a:prstGeom>
-        </p:spPr>
-        <p:style>
-          <a:lnRef idx="2">
-            <a:schemeClr val="accent1">
-              <a:shade val="50000"/>
-            </a:schemeClr>
-          </a:lnRef>
-          <a:fillRef idx="1">
-            <a:schemeClr val="accent1"/>
-          </a:fillRef>
-          <a:effectRef idx="0">
-            <a:schemeClr val="accent1"/>
-          </a:effectRef>
-          <a:fontRef idx="minor">
-            <a:schemeClr val="lt1"/>
-          </a:fontRef>
-        </p:style>
-        <p:txBody>
-          <a:bodyPr rtlCol="0" anchor="ctr"/>
-          <a:lstStyle/>
-          <a:p>
-            <a:pPr algn="ctr"/>
-            <a:r>
-              <a:rPr lang="sv-SE" b="1" dirty="0" err="1" smtClean="0"/>
-              <a:t>Traceur</a:t>
-            </a:r>
-            <a:r>
-              <a:rPr lang="sv-SE" dirty="0" smtClean="0"/>
-              <a:t> and </a:t>
-            </a:r>
-            <a:r>
-              <a:rPr lang="sv-SE" b="1" dirty="0" err="1" smtClean="0"/>
-              <a:t>Bable</a:t>
-            </a:r>
-            <a:r>
-              <a:rPr lang="sv-SE" dirty="0" smtClean="0"/>
-              <a:t> to the </a:t>
-            </a:r>
-            <a:r>
-              <a:rPr lang="sv-SE" dirty="0" err="1" smtClean="0"/>
-              <a:t>rescue</a:t>
-            </a:r>
-            <a:endParaRPr lang="sv-SE" dirty="0"/>
-          </a:p>
-        </p:txBody>
-      </p:sp>
-      <p:sp>
-        <p:nvSpPr>
-          <p:cNvPr id="27" name="AutoShape 4" descr="Bildresultat för michael j fox hoverboard"/>
-          <p:cNvSpPr>
-            <a:spLocks noChangeAspect="1" noChangeArrowheads="1"/>
-          </p:cNvSpPr>
-          <p:nvPr/>
-        </p:nvSpPr>
-        <p:spPr bwMode="auto">
-          <a:xfrm>
-            <a:off x="901417" y="3071840"/>
-            <a:ext cx="304800" cy="304801"/>
-          </a:xfrm>
-          <a:prstGeom prst="rect">
-            <a:avLst/>
-          </a:prstGeom>
-          <a:noFill/>
-          <a:extLst>
-            <a:ext uri="{909E8E84-426E-40DD-AFC4-6F175D3DCCD1}">
-              <a14:hiddenFill xmlns:a14="http://schemas.microsoft.com/office/drawing/2010/main">
-                <a:solidFill>
-                  <a:srgbClr val="FFFFFF"/>
-                </a:solidFill>
-              </a14:hiddenFill>
-            </a:ext>
-          </a:extLst>
-        </p:spPr>
-        <p:txBody>
-          <a:bodyPr vert="horz" wrap="square" lIns="91440" tIns="45720" rIns="91440" bIns="45720" numCol="1" anchor="t" anchorCtr="0" compatLnSpc="1">
-            <a:prstTxWarp prst="textNoShape">
-              <a:avLst/>
-            </a:prstTxWarp>
-          </a:bodyPr>
-          <a:lstStyle/>
-          <a:p>
-            <a:endParaRPr lang="sv-SE"/>
-          </a:p>
-        </p:txBody>
-      </p:sp>
-      <p:cxnSp>
-        <p:nvCxnSpPr>
-          <p:cNvPr id="29" name="Straight Connector 28"/>
-          <p:cNvCxnSpPr/>
-          <p:nvPr/>
-        </p:nvCxnSpPr>
-        <p:spPr>
-          <a:xfrm>
-            <a:off x="9944106" y="4620490"/>
-            <a:ext cx="0" cy="415636"/>
-          </a:xfrm>
-          <a:prstGeom prst="line">
-            <a:avLst/>
-          </a:prstGeom>
-          <a:ln w="28575"/>
-        </p:spPr>
-        <p:style>
-          <a:lnRef idx="1">
-            <a:schemeClr val="accent1"/>
-          </a:lnRef>
-          <a:fillRef idx="0">
-            <a:schemeClr val="accent1"/>
-          </a:fillRef>
-          <a:effectRef idx="0">
-            <a:schemeClr val="accent1"/>
-          </a:effectRef>
-          <a:fontRef idx="minor">
-            <a:schemeClr val="tx1"/>
-          </a:fontRef>
-        </p:style>
-      </p:cxnSp>
-      <p:sp>
-        <p:nvSpPr>
-          <p:cNvPr id="30" name="Rectangle 29"/>
-          <p:cNvSpPr/>
-          <p:nvPr/>
-        </p:nvSpPr>
-        <p:spPr>
-          <a:xfrm>
-            <a:off x="9384497" y="4134033"/>
-            <a:ext cx="1002197" cy="369332"/>
-          </a:xfrm>
-          <a:prstGeom prst="rect">
-            <a:avLst/>
-          </a:prstGeom>
-        </p:spPr>
-        <p:txBody>
-          <a:bodyPr wrap="none">
-            <a:spAutoFit/>
-          </a:bodyPr>
-          <a:lstStyle/>
-          <a:p>
-            <a:r>
-              <a:rPr lang="sv-SE" dirty="0" err="1" smtClean="0"/>
-              <a:t>oct</a:t>
-            </a:r>
-            <a:r>
-              <a:rPr lang="sv-SE" dirty="0" smtClean="0"/>
-              <a:t> </a:t>
-            </a:r>
-            <a:r>
-              <a:rPr lang="sv-SE" dirty="0"/>
-              <a:t>2015</a:t>
-            </a:r>
+              <a:rPr lang="sv-SE" sz="4400" dirty="0"/>
+              <a:t>Demo </a:t>
+            </a:r>
+            <a:r>
+              <a:rPr lang="sv-SE" sz="4400" dirty="0" smtClean="0"/>
+              <a:t>04 - </a:t>
+            </a:r>
+            <a:r>
+              <a:rPr lang="sv-SE" sz="4400" dirty="0" err="1" smtClean="0"/>
+              <a:t>routing</a:t>
+            </a:r>
+            <a:endParaRPr lang="sv-SE" sz="4400" dirty="0"/>
           </a:p>
         </p:txBody>
       </p:sp>
     </p:spTree>
     <p:extLst>
       <p:ext uri="{BB962C8B-B14F-4D97-AF65-F5344CB8AC3E}">
-        <p14:creationId xmlns:p14="http://schemas.microsoft.com/office/powerpoint/2010/main" val="2611523081"/>
+        <p14:creationId xmlns:p14="http://schemas.microsoft.com/office/powerpoint/2010/main" val="684279587"/>
       </p:ext>
     </p:extLst>
   </p:cSld>
@@ -23868,7 +24230,7 @@
 </p:sld>
 </file>
 
-<file path=ppt/slides/slide20.xml><?xml version="1.0" encoding="utf-8"?>
+<file path=ppt/slides/slide25.xml><?xml version="1.0" encoding="utf-8"?>
 <p:sld xmlns:a="http://schemas.openxmlformats.org/drawingml/2006/main" xmlns:r="http://schemas.openxmlformats.org/officeDocument/2006/relationships" xmlns:p="http://schemas.openxmlformats.org/presentationml/2006/main">
   <p:cSld>
     <p:spTree>

</xml_diff>